<commit_message>
add store ui in the design
</commit_message>
<xml_diff>
--- a/UIDesign.pptx
+++ b/UIDesign.pptx
@@ -353,11 +353,11 @@
   <p:clrMapOvr>
     <a:masterClrMapping/>
   </p:clrMapOvr>
-  <mc:AlternateContent xmlns:mc="http://schemas.openxmlformats.org/markup-compatibility/2006">
-    <mc:Choice xmlns:p14="http://schemas.microsoft.com/office/powerpoint/2010/main" Requires="p14">
+  <mc:AlternateContent xmlns:mc="http://schemas.openxmlformats.org/markup-compatibility/2006" xmlns:p14="http://schemas.microsoft.com/office/powerpoint/2010/main">
+    <mc:Choice Requires="p14">
       <p:transition p14:dur="0"/>
     </mc:Choice>
-    <mc:Fallback>
+    <mc:Fallback xmlns="">
       <p:transition xmlns:p14="http://schemas.microsoft.com/office/powerpoint/2010/main"/>
     </mc:Fallback>
   </mc:AlternateContent>
@@ -531,11 +531,11 @@
   <p:clrMapOvr>
     <a:masterClrMapping/>
   </p:clrMapOvr>
-  <mc:AlternateContent xmlns:mc="http://schemas.openxmlformats.org/markup-compatibility/2006">
-    <mc:Choice xmlns:p14="http://schemas.microsoft.com/office/powerpoint/2010/main" Requires="p14">
+  <mc:AlternateContent xmlns:mc="http://schemas.openxmlformats.org/markup-compatibility/2006" xmlns:p14="http://schemas.microsoft.com/office/powerpoint/2010/main">
+    <mc:Choice Requires="p14">
       <p:transition p14:dur="0"/>
     </mc:Choice>
-    <mc:Fallback>
+    <mc:Fallback xmlns="">
       <p:transition xmlns:p14="http://schemas.microsoft.com/office/powerpoint/2010/main"/>
     </mc:Fallback>
   </mc:AlternateContent>
@@ -719,11 +719,11 @@
   <p:clrMapOvr>
     <a:masterClrMapping/>
   </p:clrMapOvr>
-  <mc:AlternateContent xmlns:mc="http://schemas.openxmlformats.org/markup-compatibility/2006">
-    <mc:Choice xmlns:p14="http://schemas.microsoft.com/office/powerpoint/2010/main" Requires="p14">
+  <mc:AlternateContent xmlns:mc="http://schemas.openxmlformats.org/markup-compatibility/2006" xmlns:p14="http://schemas.microsoft.com/office/powerpoint/2010/main">
+    <mc:Choice Requires="p14">
       <p:transition p14:dur="0"/>
     </mc:Choice>
-    <mc:Fallback>
+    <mc:Fallback xmlns="">
       <p:transition xmlns:p14="http://schemas.microsoft.com/office/powerpoint/2010/main"/>
     </mc:Fallback>
   </mc:AlternateContent>
@@ -897,11 +897,11 @@
   <p:clrMapOvr>
     <a:masterClrMapping/>
   </p:clrMapOvr>
-  <mc:AlternateContent xmlns:mc="http://schemas.openxmlformats.org/markup-compatibility/2006">
-    <mc:Choice xmlns:p14="http://schemas.microsoft.com/office/powerpoint/2010/main" Requires="p14">
+  <mc:AlternateContent xmlns:mc="http://schemas.openxmlformats.org/markup-compatibility/2006" xmlns:p14="http://schemas.microsoft.com/office/powerpoint/2010/main">
+    <mc:Choice Requires="p14">
       <p:transition p14:dur="0"/>
     </mc:Choice>
-    <mc:Fallback>
+    <mc:Fallback xmlns="">
       <p:transition xmlns:p14="http://schemas.microsoft.com/office/powerpoint/2010/main"/>
     </mc:Fallback>
   </mc:AlternateContent>
@@ -1151,11 +1151,11 @@
   <p:clrMapOvr>
     <a:masterClrMapping/>
   </p:clrMapOvr>
-  <mc:AlternateContent xmlns:mc="http://schemas.openxmlformats.org/markup-compatibility/2006">
-    <mc:Choice xmlns:p14="http://schemas.microsoft.com/office/powerpoint/2010/main" Requires="p14">
+  <mc:AlternateContent xmlns:mc="http://schemas.openxmlformats.org/markup-compatibility/2006" xmlns:p14="http://schemas.microsoft.com/office/powerpoint/2010/main">
+    <mc:Choice Requires="p14">
       <p:transition p14:dur="0"/>
     </mc:Choice>
-    <mc:Fallback>
+    <mc:Fallback xmlns="">
       <p:transition xmlns:p14="http://schemas.microsoft.com/office/powerpoint/2010/main"/>
     </mc:Fallback>
   </mc:AlternateContent>
@@ -1447,11 +1447,11 @@
   <p:clrMapOvr>
     <a:masterClrMapping/>
   </p:clrMapOvr>
-  <mc:AlternateContent xmlns:mc="http://schemas.openxmlformats.org/markup-compatibility/2006">
-    <mc:Choice xmlns:p14="http://schemas.microsoft.com/office/powerpoint/2010/main" Requires="p14">
+  <mc:AlternateContent xmlns:mc="http://schemas.openxmlformats.org/markup-compatibility/2006" xmlns:p14="http://schemas.microsoft.com/office/powerpoint/2010/main">
+    <mc:Choice Requires="p14">
       <p:transition p14:dur="0"/>
     </mc:Choice>
-    <mc:Fallback>
+    <mc:Fallback xmlns="">
       <p:transition xmlns:p14="http://schemas.microsoft.com/office/powerpoint/2010/main"/>
     </mc:Fallback>
   </mc:AlternateContent>
@@ -1877,11 +1877,11 @@
   <p:clrMapOvr>
     <a:masterClrMapping/>
   </p:clrMapOvr>
-  <mc:AlternateContent xmlns:mc="http://schemas.openxmlformats.org/markup-compatibility/2006">
-    <mc:Choice xmlns:p14="http://schemas.microsoft.com/office/powerpoint/2010/main" Requires="p14">
+  <mc:AlternateContent xmlns:mc="http://schemas.openxmlformats.org/markup-compatibility/2006" xmlns:p14="http://schemas.microsoft.com/office/powerpoint/2010/main">
+    <mc:Choice Requires="p14">
       <p:transition p14:dur="0"/>
     </mc:Choice>
-    <mc:Fallback>
+    <mc:Fallback xmlns="">
       <p:transition xmlns:p14="http://schemas.microsoft.com/office/powerpoint/2010/main"/>
     </mc:Fallback>
   </mc:AlternateContent>
@@ -2003,11 +2003,11 @@
   <p:clrMapOvr>
     <a:masterClrMapping/>
   </p:clrMapOvr>
-  <mc:AlternateContent xmlns:mc="http://schemas.openxmlformats.org/markup-compatibility/2006">
-    <mc:Choice xmlns:p14="http://schemas.microsoft.com/office/powerpoint/2010/main" Requires="p14">
+  <mc:AlternateContent xmlns:mc="http://schemas.openxmlformats.org/markup-compatibility/2006" xmlns:p14="http://schemas.microsoft.com/office/powerpoint/2010/main">
+    <mc:Choice Requires="p14">
       <p:transition p14:dur="0"/>
     </mc:Choice>
-    <mc:Fallback>
+    <mc:Fallback xmlns="">
       <p:transition xmlns:p14="http://schemas.microsoft.com/office/powerpoint/2010/main"/>
     </mc:Fallback>
   </mc:AlternateContent>
@@ -2106,11 +2106,11 @@
   <p:clrMapOvr>
     <a:masterClrMapping/>
   </p:clrMapOvr>
-  <mc:AlternateContent xmlns:mc="http://schemas.openxmlformats.org/markup-compatibility/2006">
-    <mc:Choice xmlns:p14="http://schemas.microsoft.com/office/powerpoint/2010/main" Requires="p14">
+  <mc:AlternateContent xmlns:mc="http://schemas.openxmlformats.org/markup-compatibility/2006" xmlns:p14="http://schemas.microsoft.com/office/powerpoint/2010/main">
+    <mc:Choice Requires="p14">
       <p:transition p14:dur="0"/>
     </mc:Choice>
-    <mc:Fallback>
+    <mc:Fallback xmlns="">
       <p:transition xmlns:p14="http://schemas.microsoft.com/office/powerpoint/2010/main"/>
     </mc:Fallback>
   </mc:AlternateContent>
@@ -2391,11 +2391,11 @@
   <p:clrMapOvr>
     <a:masterClrMapping/>
   </p:clrMapOvr>
-  <mc:AlternateContent xmlns:mc="http://schemas.openxmlformats.org/markup-compatibility/2006">
-    <mc:Choice xmlns:p14="http://schemas.microsoft.com/office/powerpoint/2010/main" Requires="p14">
+  <mc:AlternateContent xmlns:mc="http://schemas.openxmlformats.org/markup-compatibility/2006" xmlns:p14="http://schemas.microsoft.com/office/powerpoint/2010/main">
+    <mc:Choice Requires="p14">
       <p:transition p14:dur="0"/>
     </mc:Choice>
-    <mc:Fallback>
+    <mc:Fallback xmlns="">
       <p:transition xmlns:p14="http://schemas.microsoft.com/office/powerpoint/2010/main"/>
     </mc:Fallback>
   </mc:AlternateContent>
@@ -2652,11 +2652,11 @@
   <p:clrMapOvr>
     <a:masterClrMapping/>
   </p:clrMapOvr>
-  <mc:AlternateContent xmlns:mc="http://schemas.openxmlformats.org/markup-compatibility/2006">
-    <mc:Choice xmlns:p14="http://schemas.microsoft.com/office/powerpoint/2010/main" Requires="p14">
+  <mc:AlternateContent xmlns:mc="http://schemas.openxmlformats.org/markup-compatibility/2006" xmlns:p14="http://schemas.microsoft.com/office/powerpoint/2010/main">
+    <mc:Choice Requires="p14">
       <p:transition p14:dur="0"/>
     </mc:Choice>
-    <mc:Fallback>
+    <mc:Fallback xmlns="">
       <p:transition xmlns:p14="http://schemas.microsoft.com/office/powerpoint/2010/main"/>
     </mc:Fallback>
   </mc:AlternateContent>
@@ -2920,11 +2920,11 @@
     <p:sldLayoutId id="2147483658" r:id="rId10"/>
     <p:sldLayoutId id="2147483659" r:id="rId11"/>
   </p:sldLayoutIdLst>
-  <mc:AlternateContent xmlns:mc="http://schemas.openxmlformats.org/markup-compatibility/2006">
-    <mc:Choice xmlns:p14="http://schemas.microsoft.com/office/powerpoint/2010/main" Requires="p14">
+  <mc:AlternateContent xmlns:mc="http://schemas.openxmlformats.org/markup-compatibility/2006" xmlns:p14="http://schemas.microsoft.com/office/powerpoint/2010/main">
+    <mc:Choice Requires="p14">
       <p:transition p14:dur="0"/>
     </mc:Choice>
-    <mc:Fallback>
+    <mc:Fallback xmlns="">
       <p:transition xmlns:p14="http://schemas.microsoft.com/office/powerpoint/2010/main"/>
     </mc:Fallback>
   </mc:AlternateContent>
@@ -3514,11 +3514,11 @@
   <p:clrMapOvr>
     <a:masterClrMapping/>
   </p:clrMapOvr>
-  <mc:AlternateContent xmlns:mc="http://schemas.openxmlformats.org/markup-compatibility/2006">
-    <mc:Choice xmlns:p14="http://schemas.microsoft.com/office/powerpoint/2010/main" Requires="p14">
+  <mc:AlternateContent xmlns:mc="http://schemas.openxmlformats.org/markup-compatibility/2006" xmlns:p14="http://schemas.microsoft.com/office/powerpoint/2010/main">
+    <mc:Choice Requires="p14">
       <p:transition p14:dur="0"/>
     </mc:Choice>
-    <mc:Fallback>
+    <mc:Fallback xmlns="">
       <p:transition xmlns:p14="http://schemas.microsoft.com/office/powerpoint/2010/main"/>
     </mc:Fallback>
   </mc:AlternateContent>
@@ -5847,11 +5847,11 @@
   <p:clrMapOvr>
     <a:masterClrMapping/>
   </p:clrMapOvr>
-  <mc:AlternateContent xmlns:mc="http://schemas.openxmlformats.org/markup-compatibility/2006">
-    <mc:Choice xmlns:p14="http://schemas.microsoft.com/office/powerpoint/2010/main" Requires="p14">
+  <mc:AlternateContent xmlns:mc="http://schemas.openxmlformats.org/markup-compatibility/2006" xmlns:p14="http://schemas.microsoft.com/office/powerpoint/2010/main">
+    <mc:Choice Requires="p14">
       <p:transition p14:dur="0"/>
     </mc:Choice>
-    <mc:Fallback>
+    <mc:Fallback xmlns="">
       <p:transition xmlns:p14="http://schemas.microsoft.com/office/powerpoint/2010/main"/>
     </mc:Fallback>
   </mc:AlternateContent>
@@ -8861,11 +8861,11 @@
   <p:clrMapOvr>
     <a:masterClrMapping/>
   </p:clrMapOvr>
-  <mc:AlternateContent xmlns:mc="http://schemas.openxmlformats.org/markup-compatibility/2006">
-    <mc:Choice xmlns:p14="http://schemas.microsoft.com/office/powerpoint/2010/main" Requires="p14">
+  <mc:AlternateContent xmlns:mc="http://schemas.openxmlformats.org/markup-compatibility/2006" xmlns:p14="http://schemas.microsoft.com/office/powerpoint/2010/main">
+    <mc:Choice Requires="p14">
       <p:transition p14:dur="0"/>
     </mc:Choice>
-    <mc:Fallback>
+    <mc:Fallback xmlns="">
       <p:transition xmlns:p14="http://schemas.microsoft.com/office/powerpoint/2010/main"/>
     </mc:Fallback>
   </mc:AlternateContent>
@@ -11604,11 +11604,11 @@
   <p:clrMapOvr>
     <a:masterClrMapping/>
   </p:clrMapOvr>
-  <mc:AlternateContent xmlns:mc="http://schemas.openxmlformats.org/markup-compatibility/2006">
-    <mc:Choice xmlns:p14="http://schemas.microsoft.com/office/powerpoint/2010/main" Requires="p14">
+  <mc:AlternateContent xmlns:mc="http://schemas.openxmlformats.org/markup-compatibility/2006" xmlns:p14="http://schemas.microsoft.com/office/powerpoint/2010/main">
+    <mc:Choice Requires="p14">
       <p:transition p14:dur="0"/>
     </mc:Choice>
-    <mc:Fallback>
+    <mc:Fallback xmlns="">
       <p:transition xmlns:p14="http://schemas.microsoft.com/office/powerpoint/2010/main"/>
     </mc:Fallback>
   </mc:AlternateContent>
@@ -11946,11 +11946,11 @@
   <p:clrMapOvr>
     <a:masterClrMapping/>
   </p:clrMapOvr>
-  <mc:AlternateContent xmlns:mc="http://schemas.openxmlformats.org/markup-compatibility/2006">
-    <mc:Choice xmlns:p14="http://schemas.microsoft.com/office/powerpoint/2010/main" Requires="p14">
+  <mc:AlternateContent xmlns:mc="http://schemas.openxmlformats.org/markup-compatibility/2006" xmlns:p14="http://schemas.microsoft.com/office/powerpoint/2010/main">
+    <mc:Choice Requires="p14">
       <p:transition p14:dur="0"/>
     </mc:Choice>
-    <mc:Fallback>
+    <mc:Fallback xmlns="">
       <p:transition xmlns:p14="http://schemas.microsoft.com/office/powerpoint/2010/main"/>
     </mc:Fallback>
   </mc:AlternateContent>
@@ -13634,11 +13634,11 @@
   <p:clrMapOvr>
     <a:masterClrMapping/>
   </p:clrMapOvr>
-  <mc:AlternateContent xmlns:mc="http://schemas.openxmlformats.org/markup-compatibility/2006">
-    <mc:Choice xmlns:p14="http://schemas.microsoft.com/office/powerpoint/2010/main" Requires="p14">
+  <mc:AlternateContent xmlns:mc="http://schemas.openxmlformats.org/markup-compatibility/2006" xmlns:p14="http://schemas.microsoft.com/office/powerpoint/2010/main">
+    <mc:Choice Requires="p14">
       <p:transition p14:dur="0"/>
     </mc:Choice>
-    <mc:Fallback>
+    <mc:Fallback xmlns="">
       <p:transition xmlns:p14="http://schemas.microsoft.com/office/powerpoint/2010/main"/>
     </mc:Fallback>
   </mc:AlternateContent>
@@ -14430,11 +14430,11 @@
   <p:clrMapOvr>
     <a:masterClrMapping/>
   </p:clrMapOvr>
-  <mc:AlternateContent xmlns:mc="http://schemas.openxmlformats.org/markup-compatibility/2006">
-    <mc:Choice xmlns:p14="http://schemas.microsoft.com/office/powerpoint/2010/main" Requires="p14">
+  <mc:AlternateContent xmlns:mc="http://schemas.openxmlformats.org/markup-compatibility/2006" xmlns:p14="http://schemas.microsoft.com/office/powerpoint/2010/main">
+    <mc:Choice Requires="p14">
       <p:transition p14:dur="0"/>
     </mc:Choice>
-    <mc:Fallback>
+    <mc:Fallback xmlns="">
       <p:transition xmlns:p14="http://schemas.microsoft.com/office/powerpoint/2010/main"/>
     </mc:Fallback>
   </mc:AlternateContent>
@@ -15092,11 +15092,11 @@
   <p:clrMapOvr>
     <a:masterClrMapping/>
   </p:clrMapOvr>
-  <mc:AlternateContent xmlns:mc="http://schemas.openxmlformats.org/markup-compatibility/2006">
-    <mc:Choice xmlns:p14="http://schemas.microsoft.com/office/powerpoint/2010/main" Requires="p14">
+  <mc:AlternateContent xmlns:mc="http://schemas.openxmlformats.org/markup-compatibility/2006" xmlns:p14="http://schemas.microsoft.com/office/powerpoint/2010/main">
+    <mc:Choice Requires="p14">
       <p:transition p14:dur="0"/>
     </mc:Choice>
-    <mc:Fallback>
+    <mc:Fallback xmlns="">
       <p:transition xmlns:p14="http://schemas.microsoft.com/office/powerpoint/2010/main"/>
     </mc:Fallback>
   </mc:AlternateContent>

</xml_diff>